<commit_message>
schematic_fig_d23b.pptx: “Scientific uncertainty” (instead of “Epistemic uncertainty”); “Ice sheet” (no hyphen).
</commit_message>
<xml_diff>
--- a/schematic_fig_d23b.pptx
+++ b/schematic_fig_d23b.pptx
@@ -243,7 +243,7 @@
           <a:p>
             <a:fld id="{10166EA3-A9EE-514E-89C7-9477AFC5A7CD}" type="datetimeFigureOut">
               <a:rPr lang="en-US" smtClean="0"/>
-              <a:t>5/3/23</a:t>
+              <a:t>2/6/24</a:t>
             </a:fld>
             <a:endParaRPr lang="en-US"/>
           </a:p>
@@ -413,7 +413,7 @@
           <a:p>
             <a:fld id="{10166EA3-A9EE-514E-89C7-9477AFC5A7CD}" type="datetimeFigureOut">
               <a:rPr lang="en-US" smtClean="0"/>
-              <a:t>5/3/23</a:t>
+              <a:t>2/6/24</a:t>
             </a:fld>
             <a:endParaRPr lang="en-US"/>
           </a:p>
@@ -593,7 +593,7 @@
           <a:p>
             <a:fld id="{10166EA3-A9EE-514E-89C7-9477AFC5A7CD}" type="datetimeFigureOut">
               <a:rPr lang="en-US" smtClean="0"/>
-              <a:t>5/3/23</a:t>
+              <a:t>2/6/24</a:t>
             </a:fld>
             <a:endParaRPr lang="en-US"/>
           </a:p>
@@ -763,7 +763,7 @@
           <a:p>
             <a:fld id="{10166EA3-A9EE-514E-89C7-9477AFC5A7CD}" type="datetimeFigureOut">
               <a:rPr lang="en-US" smtClean="0"/>
-              <a:t>5/3/23</a:t>
+              <a:t>2/6/24</a:t>
             </a:fld>
             <a:endParaRPr lang="en-US"/>
           </a:p>
@@ -1009,7 +1009,7 @@
           <a:p>
             <a:fld id="{10166EA3-A9EE-514E-89C7-9477AFC5A7CD}" type="datetimeFigureOut">
               <a:rPr lang="en-US" smtClean="0"/>
-              <a:t>5/3/23</a:t>
+              <a:t>2/6/24</a:t>
             </a:fld>
             <a:endParaRPr lang="en-US"/>
           </a:p>
@@ -1241,7 +1241,7 @@
           <a:p>
             <a:fld id="{10166EA3-A9EE-514E-89C7-9477AFC5A7CD}" type="datetimeFigureOut">
               <a:rPr lang="en-US" smtClean="0"/>
-              <a:t>5/3/23</a:t>
+              <a:t>2/6/24</a:t>
             </a:fld>
             <a:endParaRPr lang="en-US"/>
           </a:p>
@@ -1608,7 +1608,7 @@
           <a:p>
             <a:fld id="{10166EA3-A9EE-514E-89C7-9477AFC5A7CD}" type="datetimeFigureOut">
               <a:rPr lang="en-US" smtClean="0"/>
-              <a:t>5/3/23</a:t>
+              <a:t>2/6/24</a:t>
             </a:fld>
             <a:endParaRPr lang="en-US"/>
           </a:p>
@@ -1726,7 +1726,7 @@
           <a:p>
             <a:fld id="{10166EA3-A9EE-514E-89C7-9477AFC5A7CD}" type="datetimeFigureOut">
               <a:rPr lang="en-US" smtClean="0"/>
-              <a:t>5/3/23</a:t>
+              <a:t>2/6/24</a:t>
             </a:fld>
             <a:endParaRPr lang="en-US"/>
           </a:p>
@@ -1821,7 +1821,7 @@
           <a:p>
             <a:fld id="{10166EA3-A9EE-514E-89C7-9477AFC5A7CD}" type="datetimeFigureOut">
               <a:rPr lang="en-US" smtClean="0"/>
-              <a:t>5/3/23</a:t>
+              <a:t>2/6/24</a:t>
             </a:fld>
             <a:endParaRPr lang="en-US"/>
           </a:p>
@@ -2098,7 +2098,7 @@
           <a:p>
             <a:fld id="{10166EA3-A9EE-514E-89C7-9477AFC5A7CD}" type="datetimeFigureOut">
               <a:rPr lang="en-US" smtClean="0"/>
-              <a:t>5/3/23</a:t>
+              <a:t>2/6/24</a:t>
             </a:fld>
             <a:endParaRPr lang="en-US"/>
           </a:p>
@@ -2355,7 +2355,7 @@
           <a:p>
             <a:fld id="{10166EA3-A9EE-514E-89C7-9477AFC5A7CD}" type="datetimeFigureOut">
               <a:rPr lang="en-US" smtClean="0"/>
-              <a:t>5/3/23</a:t>
+              <a:t>2/6/24</a:t>
             </a:fld>
             <a:endParaRPr lang="en-US"/>
           </a:p>
@@ -2568,7 +2568,7 @@
           <a:p>
             <a:fld id="{10166EA3-A9EE-514E-89C7-9477AFC5A7CD}" type="datetimeFigureOut">
               <a:rPr lang="en-US" smtClean="0"/>
-              <a:t>5/3/23</a:t>
+              <a:t>2/6/24</a:t>
             </a:fld>
             <a:endParaRPr lang="en-US"/>
           </a:p>
@@ -3178,7 +3178,7 @@
                   </a:schemeClr>
                 </a:solidFill>
               </a:rPr>
-              <a:t>Ice-sheet process uncertainty</a:t>
+              <a:t>Ice sheet process uncertainty</a:t>
             </a:r>
           </a:p>
         </p:txBody>
@@ -3220,7 +3220,7 @@
                   </a:schemeClr>
                 </a:solidFill>
               </a:rPr>
-              <a:t>Ice-sheet response</a:t>
+              <a:t>Ice sheet response</a:t>
             </a:r>
           </a:p>
         </p:txBody>
@@ -4444,7 +4444,7 @@
                   </a:schemeClr>
                 </a:solidFill>
               </a:rPr>
-              <a:t>Ice-sheet model (ISM)</a:t>
+              <a:t>Ice sheet model (ISM)</a:t>
             </a:r>
           </a:p>
         </p:txBody>
@@ -5298,7 +5298,7 @@
                   </a:schemeClr>
                 </a:solidFill>
               </a:rPr>
-              <a:t>Epistemic uncertainty</a:t>
+              <a:t>Scientific uncertainty</a:t>
             </a:r>
           </a:p>
         </p:txBody>

</xml_diff>